<commit_message>
Fix label for DSW
</commit_message>
<xml_diff>
--- a/citymap.pptx
+++ b/citymap.pptx
@@ -259,7 +259,7 @@
           <a:p>
             <a:fld id="{4F9E8FCA-B87D-D642-AB84-528D41178B7E}" type="datetimeFigureOut">
               <a:rPr lang="en-US" smtClean="0"/>
-              <a:t>6/21/19</a:t>
+              <a:t>6/22/19</a:t>
             </a:fld>
             <a:endParaRPr lang="en-US"/>
           </a:p>
@@ -457,7 +457,7 @@
           <a:p>
             <a:fld id="{4F9E8FCA-B87D-D642-AB84-528D41178B7E}" type="datetimeFigureOut">
               <a:rPr lang="en-US" smtClean="0"/>
-              <a:t>6/21/19</a:t>
+              <a:t>6/22/19</a:t>
             </a:fld>
             <a:endParaRPr lang="en-US"/>
           </a:p>
@@ -665,7 +665,7 @@
           <a:p>
             <a:fld id="{4F9E8FCA-B87D-D642-AB84-528D41178B7E}" type="datetimeFigureOut">
               <a:rPr lang="en-US" smtClean="0"/>
-              <a:t>6/21/19</a:t>
+              <a:t>6/22/19</a:t>
             </a:fld>
             <a:endParaRPr lang="en-US"/>
           </a:p>
@@ -863,7 +863,7 @@
           <a:p>
             <a:fld id="{4F9E8FCA-B87D-D642-AB84-528D41178B7E}" type="datetimeFigureOut">
               <a:rPr lang="en-US" smtClean="0"/>
-              <a:t>6/21/19</a:t>
+              <a:t>6/22/19</a:t>
             </a:fld>
             <a:endParaRPr lang="en-US"/>
           </a:p>
@@ -1138,7 +1138,7 @@
           <a:p>
             <a:fld id="{4F9E8FCA-B87D-D642-AB84-528D41178B7E}" type="datetimeFigureOut">
               <a:rPr lang="en-US" smtClean="0"/>
-              <a:t>6/21/19</a:t>
+              <a:t>6/22/19</a:t>
             </a:fld>
             <a:endParaRPr lang="en-US"/>
           </a:p>
@@ -1403,7 +1403,7 @@
           <a:p>
             <a:fld id="{4F9E8FCA-B87D-D642-AB84-528D41178B7E}" type="datetimeFigureOut">
               <a:rPr lang="en-US" smtClean="0"/>
-              <a:t>6/21/19</a:t>
+              <a:t>6/22/19</a:t>
             </a:fld>
             <a:endParaRPr lang="en-US"/>
           </a:p>
@@ -1815,7 +1815,7 @@
           <a:p>
             <a:fld id="{4F9E8FCA-B87D-D642-AB84-528D41178B7E}" type="datetimeFigureOut">
               <a:rPr lang="en-US" smtClean="0"/>
-              <a:t>6/21/19</a:t>
+              <a:t>6/22/19</a:t>
             </a:fld>
             <a:endParaRPr lang="en-US"/>
           </a:p>
@@ -1956,7 +1956,7 @@
           <a:p>
             <a:fld id="{4F9E8FCA-B87D-D642-AB84-528D41178B7E}" type="datetimeFigureOut">
               <a:rPr lang="en-US" smtClean="0"/>
-              <a:t>6/21/19</a:t>
+              <a:t>6/22/19</a:t>
             </a:fld>
             <a:endParaRPr lang="en-US"/>
           </a:p>
@@ -2069,7 +2069,7 @@
           <a:p>
             <a:fld id="{4F9E8FCA-B87D-D642-AB84-528D41178B7E}" type="datetimeFigureOut">
               <a:rPr lang="en-US" smtClean="0"/>
-              <a:t>6/21/19</a:t>
+              <a:t>6/22/19</a:t>
             </a:fld>
             <a:endParaRPr lang="en-US"/>
           </a:p>
@@ -2380,7 +2380,7 @@
           <a:p>
             <a:fld id="{4F9E8FCA-B87D-D642-AB84-528D41178B7E}" type="datetimeFigureOut">
               <a:rPr lang="en-US" smtClean="0"/>
-              <a:t>6/21/19</a:t>
+              <a:t>6/22/19</a:t>
             </a:fld>
             <a:endParaRPr lang="en-US"/>
           </a:p>
@@ -2668,7 +2668,7 @@
           <a:p>
             <a:fld id="{4F9E8FCA-B87D-D642-AB84-528D41178B7E}" type="datetimeFigureOut">
               <a:rPr lang="en-US" smtClean="0"/>
-              <a:t>6/21/19</a:t>
+              <a:t>6/22/19</a:t>
             </a:fld>
             <a:endParaRPr lang="en-US"/>
           </a:p>
@@ -2909,7 +2909,7 @@
           <a:p>
             <a:fld id="{4F9E8FCA-B87D-D642-AB84-528D41178B7E}" type="datetimeFigureOut">
               <a:rPr lang="en-US" smtClean="0"/>
-              <a:t>6/21/19</a:t>
+              <a:t>6/22/19</a:t>
             </a:fld>
             <a:endParaRPr lang="en-US"/>
           </a:p>
@@ -4000,7 +4000,7 @@
                   <a:srgbClr val="0432FF"/>
                 </a:solidFill>
               </a:rPr>
-              <a:t>MRN</a:t>
+              <a:t>DSW</a:t>
             </a:r>
           </a:p>
         </p:txBody>

</xml_diff>

<commit_message>
Adjusted positioning of labels in SoCal
</commit_message>
<xml_diff>
--- a/citymap.pptx
+++ b/citymap.pptx
@@ -4226,10 +4226,10 @@
           </a:fontRef>
         </p:style>
         <p:txBody>
-          <a:bodyPr wrap="none" rtlCol="0" anchor="t" anchorCtr="0"/>
-          <a:lstStyle/>
-          <a:p>
-            <a:pPr fontAlgn="ctr"/>
+          <a:bodyPr wrap="none" rtlCol="0" anchor="b" anchorCtr="0"/>
+          <a:lstStyle/>
+          <a:p>
+            <a:pPr algn="r" fontAlgn="ctr"/>
             <a:r>
               <a:rPr lang="en-US" sz="1050" dirty="0">
                 <a:solidFill>
@@ -4403,15 +4403,18 @@
           </a:fontRef>
         </p:style>
         <p:txBody>
-          <a:bodyPr wrap="none" rtlCol="0" anchor="t" anchorCtr="0"/>
+          <a:bodyPr wrap="none" rtlCol="0" anchor="b" anchorCtr="0"/>
           <a:lstStyle/>
           <a:p>
             <a:pPr fontAlgn="ctr"/>
-            <a:endParaRPr lang="en-US" sz="1050" dirty="0">
-              <a:solidFill>
-                <a:srgbClr val="0432FF"/>
-              </a:solidFill>
-            </a:endParaRPr>
+            <a:r>
+              <a:rPr lang="en-US" sz="1050" dirty="0">
+                <a:solidFill>
+                  <a:srgbClr val="0432FF"/>
+                </a:solidFill>
+              </a:rPr>
+              <a:t>SCV</a:t>
+            </a:r>
           </a:p>
         </p:txBody>
       </p:sp>

</xml_diff>